<commit_message>
upgraded power point presentation graphs in r
</commit_message>
<xml_diff>
--- a/2020 R-graphs results from t-tests.pptx
+++ b/2020 R-graphs results from t-tests.pptx
@@ -106,6 +106,11 @@
       </a:defRPr>
     </a:lvl9pPr>
   </p:defaultTextStyle>
+  <p:extLst>
+    <p:ext uri="{EFAFB233-063F-42B5-8137-9DF3F51BA10A}">
+      <p15:sldGuideLst xmlns:p15="http://schemas.microsoft.com/office/powerpoint/2012/main"/>
+    </p:ext>
+  </p:extLst>
 </p:presentation>
 </file>
 
@@ -3561,6 +3566,85 @@
           <a:chExt cx="0" cy="0"/>
         </a:xfrm>
       </p:grpSpPr>
+      <p:pic>
+        <p:nvPicPr>
+          <p:cNvPr id="3" name="Picture 2">
+            <a:extLst>
+              <a:ext uri="{FF2B5EF4-FFF2-40B4-BE49-F238E27FC236}">
+                <a16:creationId xmlns:a16="http://schemas.microsoft.com/office/drawing/2014/main" id="{5131339E-AAE0-4D44-ADF0-0F45A3609E20}"/>
+              </a:ext>
+            </a:extLst>
+          </p:cNvPr>
+          <p:cNvPicPr>
+            <a:picLocks noChangeAspect="1"/>
+          </p:cNvPicPr>
+          <p:nvPr/>
+        </p:nvPicPr>
+        <p:blipFill>
+          <a:blip r:embed="rId2"/>
+          <a:stretch>
+            <a:fillRect/>
+          </a:stretch>
+        </p:blipFill>
+        <p:spPr>
+          <a:xfrm>
+            <a:off x="0" y="0"/>
+            <a:ext cx="9258300" cy="6858000"/>
+          </a:xfrm>
+          <a:prstGeom prst="rect">
+            <a:avLst/>
+          </a:prstGeom>
+        </p:spPr>
+      </p:pic>
+      <p:sp>
+        <p:nvSpPr>
+          <p:cNvPr id="4" name="TextBox 3">
+            <a:extLst>
+              <a:ext uri="{FF2B5EF4-FFF2-40B4-BE49-F238E27FC236}">
+                <a16:creationId xmlns:a16="http://schemas.microsoft.com/office/drawing/2014/main" id="{1E6E7BAE-E80E-458E-AD93-7146CC751112}"/>
+              </a:ext>
+            </a:extLst>
+          </p:cNvPr>
+          <p:cNvSpPr txBox="1"/>
+          <p:nvPr/>
+        </p:nvSpPr>
+        <p:spPr>
+          <a:xfrm>
+            <a:off x="9258300" y="400797"/>
+            <a:ext cx="2781300" cy="1477328"/>
+          </a:xfrm>
+          <a:prstGeom prst="rect">
+            <a:avLst/>
+          </a:prstGeom>
+          <a:noFill/>
+        </p:spPr>
+        <p:txBody>
+          <a:bodyPr wrap="square">
+            <a:spAutoFit/>
+          </a:bodyPr>
+          <a:lstStyle/>
+          <a:p>
+            <a:pPr marL="285750" indent="-285750">
+              <a:buFont typeface="Arial" panose="020B0604020202020204" pitchFamily="34" charset="0"/>
+              <a:buChar char="•"/>
+            </a:pPr>
+            <a:r>
+              <a:rPr lang="en-US" dirty="0"/>
+              <a:t>Datapoints are concentrated between each year</a:t>
+            </a:r>
+          </a:p>
+          <a:p>
+            <a:pPr marL="285750" indent="-285750">
+              <a:buFont typeface="Arial" panose="020B0604020202020204" pitchFamily="34" charset="0"/>
+              <a:buChar char="•"/>
+            </a:pPr>
+            <a:r>
+              <a:rPr lang="en-US" dirty="0"/>
+              <a:t>Shows a slight positive, upward trend</a:t>
+            </a:r>
+          </a:p>
+        </p:txBody>
+      </p:sp>
     </p:spTree>
     <p:extLst>
       <p:ext uri="{BB962C8B-B14F-4D97-AF65-F5344CB8AC3E}">

</xml_diff>